<commit_message>
Updating L20 slides and handout
</commit_message>
<xml_diff>
--- a/lecture/L20 - Python II/src/L20-JM-Python-II-CS10-Su15.pptx
+++ b/lecture/L20 - Python II/src/L20-JM-Python-II-CS10-Su15.pptx
@@ -7626,51 +7626,6 @@
       </p:pic>
       <p:sp>
         <p:nvSpPr>
-          <p:cNvPr id="18" name="Subtitle 48"/>
-          <p:cNvSpPr txBox="1">
-            <a:spLocks/>
-          </p:cNvSpPr>
-          <p:nvPr/>
-        </p:nvSpPr>
-        <p:spPr bwMode="auto">
-          <a:xfrm>
-            <a:off x="0" y="7772400"/>
-            <a:ext cx="14630400" cy="457200"/>
-          </a:xfrm>
-          <a:prstGeom prst="rect">
-            <a:avLst/>
-          </a:prstGeom>
-          <a:noFill/>
-          <a:ln w="9525">
-            <a:noFill/>
-            <a:miter lim="800000"/>
-            <a:headEnd/>
-            <a:tailEnd/>
-          </a:ln>
-        </p:spPr>
-        <p:txBody>
-          <a:bodyPr lIns="100554" tIns="45706" rIns="91414" bIns="45706">
-            <a:prstTxWarp prst="textNoShape">
-              <a:avLst/>
-            </a:prstTxWarp>
-          </a:bodyPr>
-          <a:lstStyle/>
-          <a:p>
-            <a:pPr algn="ctr"/>
-            <a:r>
-              <a:rPr lang="en-US" sz="2200" b="1" dirty="0">
-                <a:latin typeface="Courier"/>
-              </a:rPr>
-              <a:t>www.v3.co.uk/v3-uk/news/2403113/intel-predicts-moores-law-to-last-another-10-years</a:t>
-            </a:r>
-            <a:endParaRPr lang="en-US" sz="2200" b="1" dirty="0" smtClean="0">
-              <a:latin typeface="Courier"/>
-            </a:endParaRPr>
-          </a:p>
-        </p:txBody>
-      </p:sp>
-      <p:sp>
-        <p:nvSpPr>
           <p:cNvPr id="20" name="Oval 19"/>
           <p:cNvSpPr/>
           <p:nvPr/>
@@ -8045,11 +8000,7 @@
             <a:pPr lvl="1"/>
             <a:r>
               <a:rPr lang="en-US" sz="3200" dirty="0" smtClean="0"/>
-              <a:t>Indices start at </a:t>
-            </a:r>
-            <a:r>
-              <a:rPr lang="en-US" sz="3200" dirty="0" smtClean="0"/>
-              <a:t>0, </a:t>
+              <a:t>Indices start at 0, </a:t>
             </a:r>
             <a:r>
               <a:rPr lang="en-US" sz="3200" b="1" dirty="0" smtClean="0"/>
@@ -8057,11 +8008,7 @@
             </a:r>
             <a:r>
               <a:rPr lang="en-US" sz="3200" dirty="0" smtClean="0"/>
-              <a:t> </a:t>
-            </a:r>
-            <a:r>
-              <a:rPr lang="en-US" sz="3200" dirty="0" smtClean="0"/>
-              <a:t>1</a:t>
+              <a:t> 1</a:t>
             </a:r>
             <a:endParaRPr lang="en-US" sz="3200" i="1" dirty="0" smtClean="0"/>
           </a:p>
@@ -8105,11 +8052,7 @@
           <a:p>
             <a:r>
               <a:rPr lang="en-US" sz="3200" dirty="0" smtClean="0"/>
-              <a:t>Slicing </a:t>
-            </a:r>
-            <a:r>
-              <a:rPr lang="en-US" sz="3200" dirty="0" smtClean="0"/>
-              <a:t>and slicing notation (i.e. [::])</a:t>
+              <a:t>Slicing and slicing notation (i.e. [::])</a:t>
             </a:r>
           </a:p>
           <a:p>
@@ -8536,11 +8479,7 @@
           <a:p>
             <a:r>
               <a:rPr lang="en-US" dirty="0" smtClean="0"/>
-              <a:t>Clicker </a:t>
-            </a:r>
-            <a:r>
-              <a:rPr lang="en-US" dirty="0" smtClean="0"/>
-              <a:t>Question</a:t>
+              <a:t>Clicker Question</a:t>
             </a:r>
             <a:endParaRPr lang="en-US" dirty="0"/>
           </a:p>
@@ -8607,10 +8546,6 @@
             <a:r>
               <a:rPr lang="en-US" sz="3200" dirty="0" smtClean="0"/>
               <a:t>((Alonzo)</a:t>
-            </a:r>
-            <a:r>
-              <a:rPr lang="en-US" sz="3200" dirty="0" smtClean="0"/>
-              <a:t/>
             </a:r>
             <a:br>
               <a:rPr lang="en-US" sz="3200" dirty="0" smtClean="0"/>
@@ -8815,11 +8750,7 @@
           <a:p>
             <a:r>
               <a:rPr lang="en-US" dirty="0" smtClean="0"/>
-              <a:t>Clicker </a:t>
-            </a:r>
-            <a:r>
-              <a:rPr lang="en-US" dirty="0" smtClean="0"/>
-              <a:t>Question</a:t>
+              <a:t>Clicker Question</a:t>
             </a:r>
             <a:endParaRPr lang="en-US" dirty="0"/>
           </a:p>
@@ -8887,22 +8818,13 @@
               <a:rPr lang="en-US" sz="3200" dirty="0" smtClean="0"/>
               <a:t>[[“Alonzo”],</a:t>
             </a:r>
-            <a:r>
-              <a:rPr lang="en-US" sz="3200" dirty="0" smtClean="0"/>
-              <a:t/>
-            </a:r>
             <a:br>
               <a:rPr lang="en-US" sz="3200" dirty="0" smtClean="0"/>
             </a:br>
             <a:r>
               <a:rPr lang="en-US" sz="3200" dirty="0" smtClean="0"/>
-              <a:t> </a:t>
-            </a:r>
-            <a:r>
-              <a:rPr lang="en-US" sz="3200" dirty="0" smtClean="0"/>
-              <a:t>[“Alonzo”]] </a:t>
-            </a:r>
-            <a:endParaRPr lang="en-US" sz="3200" dirty="0" smtClean="0"/>
+              <a:t> [“Alonzo”]] </a:t>
+            </a:r>
           </a:p>
           <a:p>
             <a:pPr marL="699101" indent="-617189">
@@ -8912,10 +8834,6 @@
               <a:rPr lang="en-US" sz="3200" dirty="0" smtClean="0"/>
               <a:t>[[“Alonzo”],</a:t>
             </a:r>
-            <a:r>
-              <a:rPr lang="en-US" sz="3200" dirty="0" smtClean="0"/>
-              <a:t/>
-            </a:r>
             <a:br>
               <a:rPr lang="en-US" sz="3200" dirty="0" smtClean="0"/>
             </a:br>
@@ -8937,13 +8855,8 @@
             </a:br>
             <a:r>
               <a:rPr lang="en-US" sz="3200" dirty="0" smtClean="0"/>
-              <a:t> </a:t>
-            </a:r>
-            <a:r>
-              <a:rPr lang="en-US" sz="3200" dirty="0" smtClean="0"/>
-              <a:t>[“Alonzo”]] </a:t>
-            </a:r>
-            <a:endParaRPr lang="en-US" sz="3200" dirty="0" smtClean="0"/>
+              <a:t> [“Alonzo”]] </a:t>
+            </a:r>
           </a:p>
           <a:p>
             <a:pPr marL="699101" indent="-617189">
@@ -9042,7 +8955,19 @@
                 <a:latin typeface="Courier"/>
                 <a:cs typeface="Courier"/>
               </a:rPr>
-              <a:t>names = </a:t>
+              <a:t>names = [“Alonzo”]</a:t>
+            </a:r>
+          </a:p>
+          <a:p>
+            <a:pPr marL="81912" indent="0">
+              <a:buNone/>
+            </a:pPr>
+            <a:r>
+              <a:rPr lang="en-US" sz="2800" dirty="0" smtClean="0">
+                <a:latin typeface="Courier"/>
+                <a:cs typeface="Courier"/>
+              </a:rPr>
+              <a:t>&gt;&gt;&gt; </a:t>
             </a:r>
             <a:r>
               <a:rPr lang="en-US" sz="2800" b="1" dirty="0" smtClean="0">
@@ -9052,15 +8977,8 @@
                 <a:latin typeface="Courier"/>
                 <a:cs typeface="Courier"/>
               </a:rPr>
-              <a:t>[“Alonzo”]</a:t>
-            </a:r>
-            <a:endParaRPr lang="en-US" sz="2800" b="1" dirty="0" smtClean="0">
-              <a:solidFill>
-                <a:srgbClr val="FFFF00"/>
-              </a:solidFill>
-              <a:latin typeface="Courier"/>
-              <a:cs typeface="Courier"/>
-            </a:endParaRPr>
+              <a:t>people = [names, names]</a:t>
+            </a:r>
           </a:p>
           <a:p>
             <a:pPr marL="81912" indent="0">
@@ -9081,7 +8999,7 @@
                 <a:latin typeface="Courier"/>
                 <a:cs typeface="Courier"/>
               </a:rPr>
-              <a:t>people = [names, names]</a:t>
+              <a:t>people</a:t>
             </a:r>
           </a:p>
           <a:p>
@@ -9093,34 +9011,8 @@
                 <a:latin typeface="Courier"/>
                 <a:cs typeface="Courier"/>
               </a:rPr>
-              <a:t>&gt;&gt;&gt; </a:t>
-            </a:r>
-            <a:r>
-              <a:rPr lang="en-US" sz="2800" b="1" dirty="0" smtClean="0">
-                <a:solidFill>
-                  <a:srgbClr val="FFFF00"/>
-                </a:solidFill>
-                <a:latin typeface="Courier"/>
-                <a:cs typeface="Courier"/>
-              </a:rPr>
-              <a:t>people</a:t>
-            </a:r>
-          </a:p>
-          <a:p>
-            <a:pPr marL="81912" indent="0">
-              <a:buNone/>
-            </a:pPr>
-            <a:r>
-              <a:rPr lang="en-US" sz="2800" dirty="0" smtClean="0">
-                <a:latin typeface="Courier"/>
-                <a:cs typeface="Courier"/>
-              </a:rPr>
               <a:t>[[‘Alonzo'], [‘Alonzo']]</a:t>
             </a:r>
-            <a:endParaRPr lang="en-US" sz="2800" dirty="0" smtClean="0">
-              <a:latin typeface="Courier"/>
-              <a:cs typeface="Courier"/>
-            </a:endParaRPr>
           </a:p>
           <a:p>
             <a:pPr marL="81912" indent="0">
@@ -9348,11 +9240,7 @@
             </a:r>
             <a:r>
               <a:rPr lang="en-US" sz="3400" dirty="0" smtClean="0"/>
-              <a:t> </a:t>
-            </a:r>
-            <a:r>
-              <a:rPr lang="en-US" sz="3400" dirty="0" smtClean="0"/>
-              <a:t>from a key to a value</a:t>
+              <a:t> from a key to a value</a:t>
             </a:r>
           </a:p>
           <a:p>
@@ -9374,11 +9262,7 @@
           <a:p>
             <a:r>
               <a:rPr lang="en-US" sz="3400" dirty="0" smtClean="0"/>
-              <a:t>Adding </a:t>
-            </a:r>
-            <a:r>
-              <a:rPr lang="en-US" sz="3400" dirty="0" smtClean="0"/>
-              <a:t>elements		</a:t>
+              <a:t>Adding elements		</a:t>
             </a:r>
             <a:r>
               <a:rPr lang="en-US" sz="3400" dirty="0" err="1" smtClean="0">
@@ -9392,45 +9276,31 @@
                 <a:latin typeface="Courier"/>
                 <a:cs typeface="Courier"/>
               </a:rPr>
-              <a:t>[key</a:t>
+              <a:t>[key] = value</a:t>
+            </a:r>
+          </a:p>
+          <a:p>
+            <a:r>
+              <a:rPr lang="en-US" sz="3400" dirty="0" smtClean="0"/>
+              <a:t>Accessing elements </a:t>
+            </a:r>
+            <a:r>
+              <a:rPr lang="en-US" sz="3400" dirty="0"/>
+              <a:t>	</a:t>
+            </a:r>
+            <a:r>
+              <a:rPr lang="en-US" sz="3400" dirty="0" err="1" smtClean="0">
+                <a:latin typeface="Courier"/>
+                <a:cs typeface="Courier"/>
+              </a:rPr>
+              <a:t>dict</a:t>
             </a:r>
             <a:r>
               <a:rPr lang="en-US" sz="3400" dirty="0" smtClean="0">
                 <a:latin typeface="Courier"/>
                 <a:cs typeface="Courier"/>
               </a:rPr>
-              <a:t>] = value</a:t>
-            </a:r>
-          </a:p>
-          <a:p>
-            <a:r>
-              <a:rPr lang="en-US" sz="3400" dirty="0" smtClean="0"/>
-              <a:t>Accessing elements </a:t>
-            </a:r>
-            <a:r>
-              <a:rPr lang="en-US" sz="3400" dirty="0"/>
-              <a:t>	</a:t>
-            </a:r>
-            <a:r>
-              <a:rPr lang="en-US" sz="3400" dirty="0" err="1" smtClean="0">
-                <a:latin typeface="Courier"/>
-                <a:cs typeface="Courier"/>
-              </a:rPr>
-              <a:t>dict</a:t>
-            </a:r>
-            <a:r>
-              <a:rPr lang="en-US" sz="3400" dirty="0" smtClean="0">
-                <a:latin typeface="Courier"/>
-                <a:cs typeface="Courier"/>
-              </a:rPr>
-              <a:t>[key</a:t>
-            </a:r>
-            <a:r>
-              <a:rPr lang="en-US" sz="3400" dirty="0" smtClean="0">
-                <a:latin typeface="Courier"/>
-                <a:cs typeface="Courier"/>
-              </a:rPr>
-              <a:t>]</a:t>
+              <a:t>[key]</a:t>
             </a:r>
             <a:endParaRPr lang="en-US" sz="3400" dirty="0" smtClean="0"/>
           </a:p>
@@ -9545,7 +9415,7 @@
             </a:br>
             <a:r>
               <a:rPr lang="en-US" dirty="0" smtClean="0"/>
-              <a:t>HOFs &amp; APIs</a:t>
+              <a:t>APIs</a:t>
             </a:r>
             <a:endParaRPr lang="en-US" dirty="0"/>
           </a:p>
@@ -9919,13 +9789,8 @@
           <a:p>
             <a:r>
               <a:rPr lang="en-US" sz="3200" dirty="0" smtClean="0"/>
-              <a:t>Code files are all </a:t>
-            </a:r>
-            <a:r>
-              <a:rPr lang="en-US" sz="3200" dirty="0" smtClean="0"/>
-              <a:t>on the class website</a:t>
-            </a:r>
-            <a:endParaRPr lang="en-US" sz="3200" dirty="0" smtClean="0"/>
+              <a:t>Code files are all on the class website</a:t>
+            </a:r>
           </a:p>
           <a:p>
             <a:r>
@@ -9935,10 +9800,6 @@
               </a:rPr>
               <a:t>fractals.py</a:t>
             </a:r>
-            <a:endParaRPr lang="en-US" sz="3200" dirty="0" smtClean="0">
-              <a:latin typeface="Courier"/>
-              <a:cs typeface="Courier"/>
-            </a:endParaRPr>
           </a:p>
           <a:p>
             <a:pPr lvl="1"/>
@@ -10418,7 +10279,6 @@
               <a:rPr lang="en-US" sz="2600" dirty="0" smtClean="0"/>
               <a:t>”, 0.67)</a:t>
             </a:r>
-            <a:endParaRPr lang="en-US" sz="2600" dirty="0" smtClean="0"/>
           </a:p>
           <a:p>
             <a:r>
@@ -10692,9 +10552,6 @@
               </a:rPr>
               <a:t>?</a:t>
             </a:r>
-            <a:endParaRPr lang="en-US" sz="3200" dirty="0" smtClean="0">
-              <a:cs typeface="Courier New" panose="02070309020205020404" pitchFamily="49" charset="0"/>
-            </a:endParaRPr>
           </a:p>
           <a:p>
             <a:pPr marL="699101" indent="-617189">
@@ -10704,7 +10561,6 @@
               <a:rPr lang="en-US" sz="2800" dirty="0" smtClean="0"/>
               <a:t>self.name + “ sleeps on yours shoes.” </a:t>
             </a:r>
-            <a:endParaRPr lang="en-US" sz="2800" dirty="0" smtClean="0"/>
           </a:p>
           <a:p>
             <a:pPr marL="699101" indent="-617189">
@@ -11078,15 +10934,7 @@
           <a:p>
             <a:r>
               <a:rPr lang="en-US" sz="3200" dirty="0" smtClean="0"/>
-              <a:t>Treating everything </a:t>
-            </a:r>
-            <a:r>
-              <a:rPr lang="en-US" sz="3200" dirty="0" smtClean="0"/>
-              <a:t>as</a:t>
-            </a:r>
-            <a:r>
-              <a:rPr lang="en-US" sz="3200" dirty="0" smtClean="0"/>
-              <a:t> an object</a:t>
+              <a:t>Treating everything as an object</a:t>
             </a:r>
             <a:endParaRPr lang="en-US" sz="3200" dirty="0"/>
           </a:p>
@@ -11291,15 +11139,7 @@
             </a:r>
             <a:r>
               <a:rPr lang="en-US" dirty="0" smtClean="0"/>
-              <a:t>“text </a:t>
-            </a:r>
-            <a:r>
-              <a:rPr lang="en-US" dirty="0" smtClean="0"/>
-              <a:t>in quotes</a:t>
-            </a:r>
-            <a:r>
-              <a:rPr lang="en-US" dirty="0" smtClean="0"/>
-              <a:t>”</a:t>
+              <a:t>“text in quotes”</a:t>
             </a:r>
           </a:p>
           <a:p>
@@ -11331,15 +11171,7 @@
             </a:r>
             <a:r>
               <a:rPr lang="en-US" dirty="0" smtClean="0"/>
-              <a:t>[‘</a:t>
-            </a:r>
-            <a:r>
-              <a:rPr lang="en-US" dirty="0" smtClean="0"/>
-              <a:t>a’, ‘group’ , ‘of’, ‘items</a:t>
-            </a:r>
-            <a:r>
-              <a:rPr lang="en-US" dirty="0" smtClean="0"/>
-              <a:t>’]</a:t>
+              <a:t>[‘a’, ‘group’ , ‘of’, ‘items’]</a:t>
             </a:r>
           </a:p>
           <a:p>
@@ -11355,27 +11187,14 @@
             </a:r>
             <a:r>
               <a:rPr lang="en-US" dirty="0" smtClean="0"/>
-              <a:t> 	(‘</a:t>
-            </a:r>
+              <a:t> 	(‘a’, ‘group’, ‘of’, ‘items’) </a:t>
+            </a:r>
+          </a:p>
+          <a:p>
+            <a:pPr lvl="1"/>
             <a:r>
               <a:rPr lang="en-US" dirty="0" smtClean="0"/>
-              <a:t>a’, ‘group’, ‘of’, ‘items’) </a:t>
-            </a:r>
-            <a:endParaRPr lang="en-US" dirty="0" smtClean="0"/>
-          </a:p>
-          <a:p>
-            <a:pPr lvl="1"/>
-            <a:r>
-              <a:rPr lang="en-US" dirty="0" smtClean="0"/>
-              <a:t>a </a:t>
-            </a:r>
-            <a:r>
-              <a:rPr lang="en-US" dirty="0" smtClean="0"/>
-              <a:t>list that can’t be </a:t>
-            </a:r>
-            <a:r>
-              <a:rPr lang="en-US" dirty="0" smtClean="0"/>
-              <a:t>modified</a:t>
+              <a:t>a list that can’t be modified</a:t>
             </a:r>
           </a:p>
           <a:p>
@@ -11389,19 +11208,7 @@
             </a:r>
             <a:r>
               <a:rPr lang="en-US" dirty="0" smtClean="0"/>
-              <a:t>(start</a:t>
-            </a:r>
-            <a:r>
-              <a:rPr lang="en-US" dirty="0" smtClean="0"/>
-              <a:t>, stop, step) </a:t>
-            </a:r>
-            <a:r>
-              <a:rPr lang="en-US" dirty="0" smtClean="0"/>
-              <a:t>	 </a:t>
-            </a:r>
-            <a:r>
-              <a:rPr lang="en-US" dirty="0" smtClean="0"/>
-              <a:t>sequence of #s</a:t>
+              <a:t>(start, stop, step) 	 sequence of #s</a:t>
             </a:r>
           </a:p>
           <a:p>
@@ -11490,7 +11297,7 @@
     <mc:Choice Requires="p14">
       <p:transition spd="slow" p14:dur="2000"/>
     </mc:Choice>
-    <mc:Fallback xmlns:mv="urn:schemas-microsoft-com:mac:vml" xmlns="">
+    <mc:Fallback xmlns="" xmlns:mv="urn:schemas-microsoft-com:mac:vml">
       <p:transition spd="slow"/>
     </mc:Fallback>
   </mc:AlternateContent>
@@ -11602,11 +11409,7 @@
             </a:r>
             <a:r>
               <a:rPr lang="en-US" sz="3400" dirty="0" smtClean="0"/>
-              <a:t> </a:t>
-            </a:r>
-            <a:r>
-              <a:rPr lang="en-US" sz="3400" dirty="0" smtClean="0"/>
-              <a:t>&amp; </a:t>
+              <a:t> &amp; </a:t>
             </a:r>
             <a:r>
               <a:rPr lang="en-US" sz="3400" dirty="0" smtClean="0">
@@ -11624,9 +11427,6 @@
               </a:rPr>
               <a:t> </a:t>
             </a:r>
-            <a:endParaRPr lang="en-US" sz="3400" dirty="0" smtClean="0">
-              <a:latin typeface="+mj-lt"/>
-            </a:endParaRPr>
           </a:p>
           <a:p>
             <a:r>
@@ -11641,11 +11441,7 @@
             </a:r>
             <a:r>
               <a:rPr lang="en-US" sz="3400" dirty="0" smtClean="0"/>
-              <a:t> </a:t>
-            </a:r>
-            <a:r>
-              <a:rPr lang="en-US" sz="3400" dirty="0" smtClean="0"/>
-              <a:t>&amp; </a:t>
+              <a:t> &amp; </a:t>
             </a:r>
             <a:r>
               <a:rPr lang="en-US" sz="3400" dirty="0" smtClean="0">
@@ -11667,17 +11463,7 @@
                 <a:latin typeface="Courier New" panose="02070309020205020404" pitchFamily="49" charset="0"/>
                 <a:cs typeface="Courier New" panose="02070309020205020404" pitchFamily="49" charset="0"/>
               </a:rPr>
-              <a:t>SEQUENCE[START:END:STEP</a:t>
-            </a:r>
-            <a:r>
-              <a:rPr lang="en-US" sz="3400" dirty="0" smtClean="0">
-                <a:solidFill>
-                  <a:srgbClr val="FFFF00"/>
-                </a:solidFill>
-                <a:latin typeface="Courier New" panose="02070309020205020404" pitchFamily="49" charset="0"/>
-                <a:cs typeface="Courier New" panose="02070309020205020404" pitchFamily="49" charset="0"/>
-              </a:rPr>
-              <a:t>]</a:t>
+              <a:t>SEQUENCE[START:END:STEP]</a:t>
             </a:r>
           </a:p>
           <a:p>
@@ -11737,7 +11523,13 @@
                 <a:latin typeface="Courier"/>
                 <a:cs typeface="Courier"/>
               </a:rPr>
-              <a:t>map</a:t>
+              <a:t>map()</a:t>
+            </a:r>
+            <a:r>
+              <a:rPr lang="en-US" sz="3400" dirty="0" smtClean="0">
+                <a:latin typeface="+mj-lt"/>
+              </a:rPr>
+              <a:t> </a:t>
             </a:r>
             <a:r>
               <a:rPr lang="en-US" sz="3400" dirty="0" smtClean="0">
@@ -11747,13 +11539,11 @@
                 <a:latin typeface="Courier"/>
                 <a:cs typeface="Courier"/>
               </a:rPr>
-              <a:t>()</a:t>
-            </a:r>
-            <a:r>
-              <a:rPr lang="en-US" sz="3400" dirty="0" smtClean="0">
-                <a:latin typeface="+mj-lt"/>
-              </a:rPr>
-              <a:t> </a:t>
+              <a:t>filter()</a:t>
+            </a:r>
+            <a:r>
+              <a:rPr lang="en-US" sz="3400" dirty="0" smtClean="0"/>
+              <a:t> &amp; </a:t>
             </a:r>
             <a:r>
               <a:rPr lang="en-US" sz="3400" dirty="0" smtClean="0">
@@ -11763,31 +11553,7 @@
                 <a:latin typeface="Courier"/>
                 <a:cs typeface="Courier"/>
               </a:rPr>
-              <a:t>filter()</a:t>
-            </a:r>
-            <a:r>
-              <a:rPr lang="en-US" sz="3400" dirty="0" smtClean="0"/>
-              <a:t> &amp; </a:t>
-            </a:r>
-            <a:r>
-              <a:rPr lang="en-US" sz="3400" dirty="0" smtClean="0">
-                <a:solidFill>
-                  <a:srgbClr val="FFFF00"/>
-                </a:solidFill>
-                <a:latin typeface="Courier"/>
-                <a:cs typeface="Courier"/>
-              </a:rPr>
-              <a:t>reduce</a:t>
-            </a:r>
-            <a:r>
-              <a:rPr lang="en-US" sz="3400" dirty="0" smtClean="0">
-                <a:solidFill>
-                  <a:srgbClr val="FFFF00"/>
-                </a:solidFill>
-                <a:latin typeface="Courier"/>
-                <a:cs typeface="Courier"/>
-              </a:rPr>
-              <a:t>()</a:t>
+              <a:t>reduce()</a:t>
             </a:r>
             <a:endParaRPr lang="en-US" sz="3400" dirty="0" smtClean="0"/>
           </a:p>
@@ -11884,7 +11650,7 @@
     <mc:Choice Requires="p14">
       <p:transition spd="slow" p14:dur="2000"/>
     </mc:Choice>
-    <mc:Fallback xmlns:mv="urn:schemas-microsoft-com:mac:vml" xmlns="">
+    <mc:Fallback xmlns="" xmlns:mv="urn:schemas-microsoft-com:mac:vml">
       <p:transition spd="slow"/>
     </mc:Fallback>
   </mc:AlternateContent>

</xml_diff>